<commit_message>
changed Mojito Team Presentation.pptx - added description
</commit_message>
<xml_diff>
--- a/Mojito Team Presentation.pptx
+++ b/Mojito Team Presentation.pptx
@@ -284,7 +284,7 @@
             <a:fld id="{22B35730-BCF4-4396-B8B9-CDCD4DB8B04E}" type="datetimeFigureOut">
               <a:rPr lang="bg-BG" smtClean="0"/>
               <a:pPr/>
-              <a:t>28.8.2015 г.</a:t>
+              <a:t>3.9.2015 г.</a:t>
             </a:fld>
             <a:endParaRPr lang="bg-BG"/>
           </a:p>
@@ -451,7 +451,7 @@
             <a:fld id="{22B35730-BCF4-4396-B8B9-CDCD4DB8B04E}" type="datetimeFigureOut">
               <a:rPr lang="bg-BG" smtClean="0"/>
               <a:pPr/>
-              <a:t>28.8.2015 г.</a:t>
+              <a:t>3.9.2015 г.</a:t>
             </a:fld>
             <a:endParaRPr lang="bg-BG"/>
           </a:p>
@@ -628,7 +628,7 @@
             <a:fld id="{22B35730-BCF4-4396-B8B9-CDCD4DB8B04E}" type="datetimeFigureOut">
               <a:rPr lang="bg-BG" smtClean="0"/>
               <a:pPr/>
-              <a:t>28.8.2015 г.</a:t>
+              <a:t>3.9.2015 г.</a:t>
             </a:fld>
             <a:endParaRPr lang="bg-BG"/>
           </a:p>
@@ -795,7 +795,7 @@
             <a:fld id="{22B35730-BCF4-4396-B8B9-CDCD4DB8B04E}" type="datetimeFigureOut">
               <a:rPr lang="bg-BG" smtClean="0"/>
               <a:pPr/>
-              <a:t>28.8.2015 г.</a:t>
+              <a:t>3.9.2015 г.</a:t>
             </a:fld>
             <a:endParaRPr lang="bg-BG"/>
           </a:p>
@@ -1039,7 +1039,7 @@
             <a:fld id="{22B35730-BCF4-4396-B8B9-CDCD4DB8B04E}" type="datetimeFigureOut">
               <a:rPr lang="bg-BG" smtClean="0"/>
               <a:pPr/>
-              <a:t>28.8.2015 г.</a:t>
+              <a:t>3.9.2015 г.</a:t>
             </a:fld>
             <a:endParaRPr lang="bg-BG"/>
           </a:p>
@@ -1305,7 +1305,7 @@
             <a:fld id="{22B35730-BCF4-4396-B8B9-CDCD4DB8B04E}" type="datetimeFigureOut">
               <a:rPr lang="bg-BG" smtClean="0"/>
               <a:pPr/>
-              <a:t>28.8.2015 г.</a:t>
+              <a:t>3.9.2015 г.</a:t>
             </a:fld>
             <a:endParaRPr lang="bg-BG"/>
           </a:p>
@@ -1685,7 +1685,7 @@
             <a:fld id="{22B35730-BCF4-4396-B8B9-CDCD4DB8B04E}" type="datetimeFigureOut">
               <a:rPr lang="bg-BG" smtClean="0"/>
               <a:pPr/>
-              <a:t>28.8.2015 г.</a:t>
+              <a:t>3.9.2015 г.</a:t>
             </a:fld>
             <a:endParaRPr lang="bg-BG"/>
           </a:p>
@@ -1837,7 +1837,7 @@
             <a:fld id="{22B35730-BCF4-4396-B8B9-CDCD4DB8B04E}" type="datetimeFigureOut">
               <a:rPr lang="bg-BG" smtClean="0"/>
               <a:pPr/>
-              <a:t>28.8.2015 г.</a:t>
+              <a:t>3.9.2015 г.</a:t>
             </a:fld>
             <a:endParaRPr lang="bg-BG"/>
           </a:p>
@@ -1929,7 +1929,7 @@
             <a:fld id="{22B35730-BCF4-4396-B8B9-CDCD4DB8B04E}" type="datetimeFigureOut">
               <a:rPr lang="bg-BG" smtClean="0"/>
               <a:pPr/>
-              <a:t>28.8.2015 г.</a:t>
+              <a:t>3.9.2015 г.</a:t>
             </a:fld>
             <a:endParaRPr lang="bg-BG"/>
           </a:p>
@@ -2192,7 +2192,7 @@
             <a:fld id="{22B35730-BCF4-4396-B8B9-CDCD4DB8B04E}" type="datetimeFigureOut">
               <a:rPr lang="bg-BG" smtClean="0"/>
               <a:pPr/>
-              <a:t>28.8.2015 г.</a:t>
+              <a:t>3.9.2015 г.</a:t>
             </a:fld>
             <a:endParaRPr lang="bg-BG"/>
           </a:p>
@@ -2482,7 +2482,7 @@
             <a:fld id="{22B35730-BCF4-4396-B8B9-CDCD4DB8B04E}" type="datetimeFigureOut">
               <a:rPr lang="bg-BG" smtClean="0"/>
               <a:pPr/>
-              <a:t>28.8.2015 г.</a:t>
+              <a:t>3.9.2015 г.</a:t>
             </a:fld>
             <a:endParaRPr lang="bg-BG"/>
           </a:p>
@@ -3255,7 +3255,7 @@
             <a:fld id="{22B35730-BCF4-4396-B8B9-CDCD4DB8B04E}" type="datetimeFigureOut">
               <a:rPr lang="bg-BG" smtClean="0"/>
               <a:pPr/>
-              <a:t>28.8.2015 г.</a:t>
+              <a:t>3.9.2015 г.</a:t>
             </a:fld>
             <a:endParaRPr lang="bg-BG"/>
           </a:p>
@@ -4017,11 +4017,7 @@
             </a:pPr>
             <a:r>
               <a:rPr lang="en-US" sz="3200" b="1" dirty="0" smtClean="0"/>
-              <a:t>JavaScript </a:t>
-            </a:r>
-            <a:r>
-              <a:rPr lang="en-US" sz="3200" b="1" dirty="0" smtClean="0"/>
-              <a:t>Applications </a:t>
+              <a:t>JavaScript Applications </a:t>
             </a:r>
             <a:r>
               <a:rPr kumimoji="0" lang="en-US" sz="3200" b="1" i="0" u="none" strike="noStrike" kern="1200" cap="none" spc="0" normalizeH="0" baseline="0" noProof="0" dirty="0" smtClean="0">
@@ -4390,13 +4386,7 @@
               <a:rPr lang="en-US" b="1" i="1" dirty="0" smtClean="0">
                 <a:latin typeface="+mn-lt"/>
               </a:rPr>
-              <a:t> </a:t>
-            </a:r>
-            <a:r>
-              <a:rPr lang="en-US" b="1" i="1" dirty="0" smtClean="0">
-                <a:latin typeface="+mn-lt"/>
-              </a:rPr>
-              <a:t>Team</a:t>
+              <a:t> Team</a:t>
             </a:r>
             <a:endParaRPr lang="bg-BG" b="1" i="1" dirty="0">
               <a:latin typeface="+mn-lt"/>
@@ -5423,7 +5413,7 @@
         </p:nvSpPr>
         <p:spPr>
           <a:xfrm>
-            <a:off x="467544" y="404664"/>
+            <a:off x="467544" y="332656"/>
             <a:ext cx="8229600" cy="1143000"/>
           </a:xfrm>
         </p:spPr>
@@ -5456,8 +5446,8 @@
         </p:nvSpPr>
         <p:spPr>
           <a:xfrm>
-            <a:off x="395536" y="1628800"/>
-            <a:ext cx="8229600" cy="4389120"/>
+            <a:off x="683568" y="1484784"/>
+            <a:ext cx="6336704" cy="5184576"/>
           </a:xfrm>
         </p:spPr>
         <p:txBody>
@@ -5466,7 +5456,228 @@
           </a:bodyPr>
           <a:lstStyle/>
           <a:p>
-            <a:endParaRPr lang="en-US" sz="2800" dirty="0" smtClean="0">
+            <a:r>
+              <a:rPr lang="en-US" sz="2800" dirty="0" smtClean="0">
+                <a:solidFill>
+                  <a:schemeClr val="tx2"/>
+                </a:solidFill>
+              </a:rPr>
+              <a:t>Registration</a:t>
+            </a:r>
+            <a:endParaRPr lang="bg-BG" sz="2800" dirty="0" smtClean="0">
+              <a:solidFill>
+                <a:schemeClr val="tx2"/>
+              </a:solidFill>
+            </a:endParaRPr>
+          </a:p>
+          <a:p>
+            <a:r>
+              <a:rPr lang="en-US" sz="2800" dirty="0" smtClean="0">
+                <a:solidFill>
+                  <a:schemeClr val="tx2"/>
+                </a:solidFill>
+              </a:rPr>
+              <a:t>C</a:t>
+            </a:r>
+            <a:r>
+              <a:rPr lang="en-US" sz="2800" dirty="0" smtClean="0">
+                <a:solidFill>
+                  <a:schemeClr val="tx2"/>
+                </a:solidFill>
+              </a:rPr>
+              <a:t>reating trips</a:t>
+            </a:r>
+          </a:p>
+          <a:p>
+            <a:r>
+              <a:rPr lang="en-US" sz="2800" dirty="0" smtClean="0">
+                <a:solidFill>
+                  <a:schemeClr val="tx2"/>
+                </a:solidFill>
+              </a:rPr>
+              <a:t>P</a:t>
+            </a:r>
+            <a:r>
+              <a:rPr lang="en-US" sz="2800" dirty="0" smtClean="0">
+                <a:solidFill>
+                  <a:schemeClr val="tx2"/>
+                </a:solidFill>
+              </a:rPr>
+              <a:t>articipation </a:t>
+            </a:r>
+            <a:r>
+              <a:rPr lang="en-US" sz="2800" dirty="0" smtClean="0">
+                <a:solidFill>
+                  <a:schemeClr val="tx2"/>
+                </a:solidFill>
+              </a:rPr>
+              <a:t>in </a:t>
+            </a:r>
+            <a:r>
+              <a:rPr lang="en-US" sz="2800" dirty="0" smtClean="0">
+                <a:solidFill>
+                  <a:schemeClr val="tx2"/>
+                </a:solidFill>
+              </a:rPr>
+              <a:t>travel</a:t>
+            </a:r>
+          </a:p>
+          <a:p>
+            <a:r>
+              <a:rPr lang="en-US" sz="2800" dirty="0" smtClean="0">
+                <a:solidFill>
+                  <a:schemeClr val="tx2"/>
+                </a:solidFill>
+              </a:rPr>
+              <a:t>Used: </a:t>
+            </a:r>
+            <a:endParaRPr lang="bg-BG" sz="2800" dirty="0" smtClean="0">
+              <a:solidFill>
+                <a:schemeClr val="tx2"/>
+              </a:solidFill>
+            </a:endParaRPr>
+          </a:p>
+          <a:p>
+            <a:pPr lvl="1">
+              <a:buFont typeface="Courier New" pitchFamily="49" charset="0"/>
+              <a:buChar char="o"/>
+            </a:pPr>
+            <a:r>
+              <a:rPr lang="en-US" dirty="0" err="1" smtClean="0">
+                <a:solidFill>
+                  <a:schemeClr val="tx2"/>
+                </a:solidFill>
+              </a:rPr>
+              <a:t>Telerik</a:t>
+            </a:r>
+            <a:r>
+              <a:rPr lang="en-US" dirty="0" smtClean="0">
+                <a:solidFill>
+                  <a:schemeClr val="tx2"/>
+                </a:solidFill>
+              </a:rPr>
+              <a:t> </a:t>
+            </a:r>
+            <a:r>
+              <a:rPr lang="en-US" dirty="0" smtClean="0">
+                <a:solidFill>
+                  <a:schemeClr val="tx2"/>
+                </a:solidFill>
+              </a:rPr>
+              <a:t>Backend </a:t>
+            </a:r>
+            <a:r>
+              <a:rPr lang="en-US" dirty="0" smtClean="0">
+                <a:solidFill>
+                  <a:schemeClr val="tx2"/>
+                </a:solidFill>
+              </a:rPr>
+              <a:t>Services</a:t>
+            </a:r>
+            <a:endParaRPr lang="bg-BG" dirty="0" smtClean="0">
+              <a:solidFill>
+                <a:schemeClr val="tx2"/>
+              </a:solidFill>
+            </a:endParaRPr>
+          </a:p>
+          <a:p>
+            <a:pPr lvl="1">
+              <a:buFont typeface="Courier New" pitchFamily="49" charset="0"/>
+              <a:buChar char="o"/>
+            </a:pPr>
+            <a:r>
+              <a:rPr lang="en-US" dirty="0" err="1" smtClean="0">
+                <a:solidFill>
+                  <a:schemeClr val="tx2"/>
+                </a:solidFill>
+              </a:rPr>
+              <a:t>jQuery</a:t>
+            </a:r>
+            <a:endParaRPr lang="bg-BG" dirty="0" smtClean="0">
+              <a:solidFill>
+                <a:schemeClr val="tx2"/>
+              </a:solidFill>
+            </a:endParaRPr>
+          </a:p>
+          <a:p>
+            <a:pPr lvl="1">
+              <a:buFont typeface="Courier New" pitchFamily="49" charset="0"/>
+              <a:buChar char="o"/>
+            </a:pPr>
+            <a:r>
+              <a:rPr lang="en-US" dirty="0" smtClean="0">
+                <a:solidFill>
+                  <a:schemeClr val="tx2"/>
+                </a:solidFill>
+              </a:rPr>
+              <a:t>Bootstrap</a:t>
+            </a:r>
+            <a:endParaRPr lang="bg-BG" dirty="0" smtClean="0">
+              <a:solidFill>
+                <a:schemeClr val="tx2"/>
+              </a:solidFill>
+            </a:endParaRPr>
+          </a:p>
+          <a:p>
+            <a:pPr lvl="1">
+              <a:buFont typeface="Courier New" pitchFamily="49" charset="0"/>
+              <a:buChar char="o"/>
+            </a:pPr>
+            <a:r>
+              <a:rPr lang="en-US" dirty="0" smtClean="0">
+                <a:solidFill>
+                  <a:schemeClr val="tx2"/>
+                </a:solidFill>
+              </a:rPr>
+              <a:t>OOCSS</a:t>
+            </a:r>
+            <a:endParaRPr lang="bg-BG" dirty="0" smtClean="0">
+              <a:solidFill>
+                <a:schemeClr val="tx2"/>
+              </a:solidFill>
+            </a:endParaRPr>
+          </a:p>
+          <a:p>
+            <a:pPr lvl="1">
+              <a:buFont typeface="Courier New" pitchFamily="49" charset="0"/>
+              <a:buChar char="o"/>
+            </a:pPr>
+            <a:r>
+              <a:rPr lang="en-US" dirty="0" smtClean="0">
+                <a:solidFill>
+                  <a:schemeClr val="tx2"/>
+                </a:solidFill>
+              </a:rPr>
+              <a:t>REST API</a:t>
+            </a:r>
+            <a:endParaRPr lang="bg-BG" dirty="0" smtClean="0">
+              <a:solidFill>
+                <a:schemeClr val="tx2"/>
+              </a:solidFill>
+            </a:endParaRPr>
+          </a:p>
+          <a:p>
+            <a:pPr lvl="1">
+              <a:buFont typeface="Courier New" pitchFamily="49" charset="0"/>
+              <a:buChar char="o"/>
+            </a:pPr>
+            <a:r>
+              <a:rPr lang="en-US" dirty="0" smtClean="0">
+                <a:solidFill>
+                  <a:schemeClr val="tx2"/>
+                </a:solidFill>
+              </a:rPr>
+              <a:t>Google </a:t>
+            </a:r>
+            <a:r>
+              <a:rPr lang="en-US" dirty="0" smtClean="0">
+                <a:solidFill>
+                  <a:schemeClr val="tx2"/>
+                </a:solidFill>
+              </a:rPr>
+              <a:t>Maps API</a:t>
+            </a:r>
+            <a:endParaRPr lang="en-US" dirty="0" smtClean="0">
               <a:solidFill>
                 <a:schemeClr val="tx2"/>
               </a:solidFill>

</xml_diff>

<commit_message>
added picture in Mojito Team Presentation.pptx
</commit_message>
<xml_diff>
--- a/Mojito Team Presentation.pptx
+++ b/Mojito Team Presentation.pptx
@@ -5413,7 +5413,7 @@
         </p:nvSpPr>
         <p:spPr>
           <a:xfrm>
-            <a:off x="467544" y="332656"/>
+            <a:off x="467544" y="260648"/>
             <a:ext cx="8229600" cy="1143000"/>
           </a:xfrm>
         </p:spPr>
@@ -5446,7 +5446,7 @@
         </p:nvSpPr>
         <p:spPr>
           <a:xfrm>
-            <a:off x="683568" y="1484784"/>
+            <a:off x="683568" y="1673424"/>
             <a:ext cx="6336704" cy="5184576"/>
           </a:xfrm>
         </p:spPr>
@@ -5477,49 +5477,17 @@
                   <a:schemeClr val="tx2"/>
                 </a:solidFill>
               </a:rPr>
-              <a:t>C</a:t>
-            </a:r>
+              <a:t>Creating trips</a:t>
+            </a:r>
+          </a:p>
+          <a:p>
             <a:r>
               <a:rPr lang="en-US" sz="2800" dirty="0" smtClean="0">
                 <a:solidFill>
                   <a:schemeClr val="tx2"/>
                 </a:solidFill>
               </a:rPr>
-              <a:t>reating trips</a:t>
-            </a:r>
-          </a:p>
-          <a:p>
-            <a:r>
-              <a:rPr lang="en-US" sz="2800" dirty="0" smtClean="0">
-                <a:solidFill>
-                  <a:schemeClr val="tx2"/>
-                </a:solidFill>
-              </a:rPr>
-              <a:t>P</a:t>
-            </a:r>
-            <a:r>
-              <a:rPr lang="en-US" sz="2800" dirty="0" smtClean="0">
-                <a:solidFill>
-                  <a:schemeClr val="tx2"/>
-                </a:solidFill>
-              </a:rPr>
-              <a:t>articipation </a:t>
-            </a:r>
-            <a:r>
-              <a:rPr lang="en-US" sz="2800" dirty="0" smtClean="0">
-                <a:solidFill>
-                  <a:schemeClr val="tx2"/>
-                </a:solidFill>
-              </a:rPr>
-              <a:t>in </a:t>
-            </a:r>
-            <a:r>
-              <a:rPr lang="en-US" sz="2800" dirty="0" smtClean="0">
-                <a:solidFill>
-                  <a:schemeClr val="tx2"/>
-                </a:solidFill>
-              </a:rPr>
-              <a:t>travel</a:t>
+              <a:t>Participation in travel</a:t>
             </a:r>
           </a:p>
           <a:p>
@@ -5556,23 +5524,7 @@
                   <a:schemeClr val="tx2"/>
                 </a:solidFill>
               </a:rPr>
-              <a:t> </a:t>
-            </a:r>
-            <a:r>
-              <a:rPr lang="en-US" dirty="0" smtClean="0">
-                <a:solidFill>
-                  <a:schemeClr val="tx2"/>
-                </a:solidFill>
-              </a:rPr>
-              <a:t>Backend </a:t>
-            </a:r>
-            <a:r>
-              <a:rPr lang="en-US" dirty="0" smtClean="0">
-                <a:solidFill>
-                  <a:schemeClr val="tx2"/>
-                </a:solidFill>
-              </a:rPr>
-              <a:t>Services</a:t>
+              <a:t> Backend Services</a:t>
             </a:r>
             <a:endParaRPr lang="bg-BG" dirty="0" smtClean="0">
               <a:solidFill>
@@ -5667,24 +5619,37 @@
                   <a:schemeClr val="tx2"/>
                 </a:solidFill>
               </a:rPr>
-              <a:t>Google </a:t>
-            </a:r>
-            <a:r>
-              <a:rPr lang="en-US" dirty="0" smtClean="0">
-                <a:solidFill>
-                  <a:schemeClr val="tx2"/>
-                </a:solidFill>
-              </a:rPr>
-              <a:t>Maps API</a:t>
-            </a:r>
-            <a:endParaRPr lang="en-US" dirty="0" smtClean="0">
-              <a:solidFill>
-                <a:schemeClr val="tx2"/>
-              </a:solidFill>
-            </a:endParaRPr>
-          </a:p>
-        </p:txBody>
-      </p:sp>
+              <a:t>Google Maps API</a:t>
+            </a:r>
+          </a:p>
+        </p:txBody>
+      </p:sp>
+      <p:pic>
+        <p:nvPicPr>
+          <p:cNvPr id="1026" name="Picture 2" descr="C:\Users\Петя\Desktop\aside-baner-3.jpg"/>
+          <p:cNvPicPr>
+            <a:picLocks noChangeAspect="1" noChangeArrowheads="1"/>
+          </p:cNvPicPr>
+          <p:nvPr/>
+        </p:nvPicPr>
+        <p:blipFill>
+          <a:blip r:embed="rId2" cstate="print"/>
+          <a:srcRect/>
+          <a:stretch>
+            <a:fillRect/>
+          </a:stretch>
+        </p:blipFill>
+        <p:spPr bwMode="auto">
+          <a:xfrm>
+            <a:off x="4932040" y="3717032"/>
+            <a:ext cx="3913734" cy="2609156"/>
+          </a:xfrm>
+          <a:prstGeom prst="rect">
+            <a:avLst/>
+          </a:prstGeom>
+          <a:noFill/>
+        </p:spPr>
+      </p:pic>
     </p:spTree>
   </p:cSld>
   <p:clrMapOvr>

</xml_diff>